<commit_message>
minor update to the power point
</commit_message>
<xml_diff>
--- a/materials/Indy_2024.pptx
+++ b/materials/Indy_2024.pptx
@@ -21,10 +21,10 @@
     <p:sldId id="326" r:id="rId12"/>
     <p:sldId id="331" r:id="rId13"/>
     <p:sldId id="327" r:id="rId14"/>
-    <p:sldId id="332" r:id="rId15"/>
-    <p:sldId id="333" r:id="rId16"/>
-    <p:sldId id="334" r:id="rId17"/>
-    <p:sldId id="310" r:id="rId18"/>
+    <p:sldId id="310" r:id="rId15"/>
+    <p:sldId id="332" r:id="rId16"/>
+    <p:sldId id="333" r:id="rId17"/>
+    <p:sldId id="334" r:id="rId18"/>
   </p:sldIdLst>
   <p:sldSz cx="12192000" cy="6858000"/>
   <p:notesSz cx="6858000" cy="9144000"/>
@@ -234,7 +234,7 @@
           <a:p>
             <a:fld id="{4BE6205E-B305-4B90-9534-3C5E99A0275E}" type="datetimeFigureOut">
               <a:rPr lang="en-US" smtClean="0"/>
-              <a:t>3/17/24</a:t>
+              <a:t>3/18/24</a:t>
             </a:fld>
             <a:endParaRPr lang="en-US" dirty="0"/>
           </a:p>
@@ -411,7 +411,7 @@
           <a:p>
             <a:fld id="{233722F1-E430-42A1-A473-1759336AECCE}" type="datetimeFigureOut">
               <a:rPr lang="en-US" smtClean="0"/>
-              <a:t>3/17/24</a:t>
+              <a:t>3/18/24</a:t>
             </a:fld>
             <a:endParaRPr lang="en-US" dirty="0"/>
           </a:p>
@@ -6331,8 +6331,20 @@
           <a:p>
             <a:pPr lvl="1"/>
             <a:r>
+              <a:rPr lang="en-GB" sz="1800" dirty="0" err="1">
+                <a:hlinkClick r:id="rId3"/>
+              </a:rPr>
+              <a:t>MLOps</a:t>
+            </a:r>
+            <a:r>
+              <a:rPr lang="en-GB" sz="1800" dirty="0">
+                <a:hlinkClick r:id="rId3"/>
+              </a:rPr>
+              <a:t> (Deploying, Serving &amp; Monitoring) </a:t>
+            </a:r>
+            <a:r>
               <a:rPr lang="en-GB" sz="1800" dirty="0"/>
-              <a:t>Deploying, serving &amp; monitoring</a:t>
+              <a:t>is an important part of the job! </a:t>
             </a:r>
           </a:p>
         </p:txBody>
@@ -6399,10 +6411,10 @@
       </p:grpSpPr>
       <p:sp>
         <p:nvSpPr>
-          <p:cNvPr id="2" name="Title 1">
-            <a:extLst>
-              <a:ext uri="{FF2B5EF4-FFF2-40B4-BE49-F238E27FC236}">
-                <a16:creationId xmlns:a16="http://schemas.microsoft.com/office/drawing/2014/main" id="{CFDEBC60-AA38-5DEF-3160-0CAA68F3D28C}"/>
+          <p:cNvPr id="3" name="Title 2">
+            <a:extLst>
+              <a:ext uri="{FF2B5EF4-FFF2-40B4-BE49-F238E27FC236}">
+                <a16:creationId xmlns:a16="http://schemas.microsoft.com/office/drawing/2014/main" id="{F101732C-7338-DBA0-BD19-1FA88304749F}"/>
               </a:ext>
             </a:extLst>
           </p:cNvPr>
@@ -6415,85 +6427,78 @@
         </p:nvSpPr>
         <p:spPr>
           <a:xfrm>
-            <a:off x="1468815" y="503852"/>
-            <a:ext cx="9150675" cy="1427585"/>
+            <a:off x="1317614" y="690511"/>
+            <a:ext cx="8709255" cy="5253089"/>
           </a:xfrm>
         </p:spPr>
         <p:txBody>
-          <a:bodyPr/>
+          <a:bodyPr anchor="t"/>
           <a:lstStyle/>
           <a:p>
             <a:r>
-              <a:rPr lang="en-ZA" dirty="0"/>
-              <a:t>Appendices:</a:t>
+              <a:rPr lang="en-US" dirty="0"/>
+              <a:t>Thank you!</a:t>
             </a:r>
           </a:p>
         </p:txBody>
       </p:sp>
       <p:sp>
         <p:nvSpPr>
-          <p:cNvPr id="4" name="Slide Number Placeholder 3">
-            <a:extLst>
-              <a:ext uri="{FF2B5EF4-FFF2-40B4-BE49-F238E27FC236}">
-                <a16:creationId xmlns:a16="http://schemas.microsoft.com/office/drawing/2014/main" id="{527C964F-E2D5-D8E7-C513-C47A7E409DF3}"/>
-              </a:ext>
-            </a:extLst>
-          </p:cNvPr>
-          <p:cNvSpPr>
-            <a:spLocks noGrp="1"/>
-          </p:cNvSpPr>
-          <p:nvPr>
-            <p:ph type="sldNum" sz="quarter" idx="15"/>
-          </p:nvPr>
+          <p:cNvPr id="6" name="TextBox 5">
+            <a:extLst>
+              <a:ext uri="{FF2B5EF4-FFF2-40B4-BE49-F238E27FC236}">
+                <a16:creationId xmlns:a16="http://schemas.microsoft.com/office/drawing/2014/main" id="{B882ECDE-9185-5821-9D2E-B4B06D98D983}"/>
+              </a:ext>
+            </a:extLst>
+          </p:cNvPr>
+          <p:cNvSpPr txBox="1"/>
+          <p:nvPr/>
         </p:nvSpPr>
-        <p:spPr/>
-        <p:txBody>
-          <a:bodyPr/>
-          <a:lstStyle/>
-          <a:p>
-            <a:fld id="{18D65601-5AE2-46FC-B138-694DDD2B510D}" type="slidenum">
-              <a:rPr lang="en-US" smtClean="0"/>
-              <a:pPr/>
-              <a:t>11</a:t>
-            </a:fld>
-            <a:endParaRPr lang="en-US" dirty="0"/>
-          </a:p>
-        </p:txBody>
-      </p:sp>
-      <p:pic>
-        <p:nvPicPr>
-          <p:cNvPr id="8" name="Picture 7" descr="A graph of a graph with a line&#10;&#10;Description automatically generated with medium confidence">
-            <a:extLst>
-              <a:ext uri="{FF2B5EF4-FFF2-40B4-BE49-F238E27FC236}">
-                <a16:creationId xmlns:a16="http://schemas.microsoft.com/office/drawing/2014/main" id="{FC3EDD0A-1B26-64F0-9722-EB1A3D47C185}"/>
-              </a:ext>
-            </a:extLst>
-          </p:cNvPr>
-          <p:cNvPicPr>
-            <a:picLocks noChangeAspect="1"/>
-          </p:cNvPicPr>
-          <p:nvPr/>
-        </p:nvPicPr>
-        <p:blipFill>
-          <a:blip r:embed="rId2"/>
-          <a:stretch>
-            <a:fillRect/>
-          </a:stretch>
-        </p:blipFill>
-        <p:spPr>
-          <a:xfrm>
-            <a:off x="2949977" y="1589402"/>
-            <a:ext cx="6292046" cy="4764746"/>
+        <p:spPr>
+          <a:xfrm>
+            <a:off x="3550723" y="3317055"/>
+            <a:ext cx="5296394" cy="1015663"/>
           </a:xfrm>
           <a:prstGeom prst="rect">
             <a:avLst/>
           </a:prstGeom>
-        </p:spPr>
-      </p:pic>
+          <a:noFill/>
+        </p:spPr>
+        <p:txBody>
+          <a:bodyPr wrap="square" rtlCol="0">
+            <a:spAutoFit/>
+          </a:bodyPr>
+          <a:lstStyle/>
+          <a:p>
+            <a:r>
+              <a:rPr lang="en-FR" sz="6000" b="1" dirty="0">
+                <a:solidFill>
+                  <a:schemeClr val="bg1"/>
+                </a:solidFill>
+              </a:rPr>
+              <a:t>Questions? </a:t>
+            </a:r>
+            <a:r>
+              <a:rPr lang="en-FR" sz="6000" b="1" dirty="0">
+                <a:solidFill>
+                  <a:schemeClr val="bg1"/>
+                </a:solidFill>
+                <a:sym typeface="Wingdings" pitchFamily="2" charset="2"/>
+              </a:rPr>
+              <a:t></a:t>
+            </a:r>
+            <a:endParaRPr lang="en-FR" sz="6000" b="1" dirty="0">
+              <a:solidFill>
+                <a:schemeClr val="bg1"/>
+              </a:solidFill>
+            </a:endParaRPr>
+          </a:p>
+        </p:txBody>
+      </p:sp>
     </p:spTree>
     <p:extLst>
       <p:ext uri="{BB962C8B-B14F-4D97-AF65-F5344CB8AC3E}">
-        <p14:creationId xmlns:p14="http://schemas.microsoft.com/office/powerpoint/2010/main" val="3742424132"/>
+        <p14:creationId xmlns:p14="http://schemas.microsoft.com/office/powerpoint/2010/main" val="1016869167"/>
       </p:ext>
     </p:extLst>
   </p:cSld>
@@ -6585,10 +6590,10 @@
       </p:sp>
       <p:pic>
         <p:nvPicPr>
-          <p:cNvPr id="5" name="Picture 4" descr="A graph with numbers and lines&#10;&#10;Description automatically generated">
-            <a:extLst>
-              <a:ext uri="{FF2B5EF4-FFF2-40B4-BE49-F238E27FC236}">
-                <a16:creationId xmlns:a16="http://schemas.microsoft.com/office/drawing/2014/main" id="{E013AA7C-0DDD-2AAB-E20A-68A262305189}"/>
+          <p:cNvPr id="8" name="Picture 7" descr="A graph of a graph with a line&#10;&#10;Description automatically generated with medium confidence">
+            <a:extLst>
+              <a:ext uri="{FF2B5EF4-FFF2-40B4-BE49-F238E27FC236}">
+                <a16:creationId xmlns:a16="http://schemas.microsoft.com/office/drawing/2014/main" id="{FC3EDD0A-1B26-64F0-9722-EB1A3D47C185}"/>
               </a:ext>
             </a:extLst>
           </p:cNvPr>
@@ -6605,8 +6610,8 @@
         </p:blipFill>
         <p:spPr>
           <a:xfrm>
-            <a:off x="1043569" y="1513358"/>
-            <a:ext cx="10484133" cy="4840790"/>
+            <a:off x="2949977" y="1589402"/>
+            <a:ext cx="6292046" cy="4764746"/>
           </a:xfrm>
           <a:prstGeom prst="rect">
             <a:avLst/>
@@ -6616,7 +6621,7 @@
     </p:spTree>
     <p:extLst>
       <p:ext uri="{BB962C8B-B14F-4D97-AF65-F5344CB8AC3E}">
-        <p14:creationId xmlns:p14="http://schemas.microsoft.com/office/powerpoint/2010/main" val="3327239054"/>
+        <p14:creationId xmlns:p14="http://schemas.microsoft.com/office/powerpoint/2010/main" val="3742424132"/>
       </p:ext>
     </p:extLst>
   </p:cSld>
@@ -6708,10 +6713,10 @@
       </p:sp>
       <p:pic>
         <p:nvPicPr>
-          <p:cNvPr id="6" name="Picture 5" descr="A colorful squares with different colored numbers&#10;&#10;Description automatically generated with medium confidence">
-            <a:extLst>
-              <a:ext uri="{FF2B5EF4-FFF2-40B4-BE49-F238E27FC236}">
-                <a16:creationId xmlns:a16="http://schemas.microsoft.com/office/drawing/2014/main" id="{7C14183A-DEB2-64DA-1EA9-223477975388}"/>
+          <p:cNvPr id="5" name="Picture 4" descr="A graph with numbers and lines&#10;&#10;Description automatically generated">
+            <a:extLst>
+              <a:ext uri="{FF2B5EF4-FFF2-40B4-BE49-F238E27FC236}">
+                <a16:creationId xmlns:a16="http://schemas.microsoft.com/office/drawing/2014/main" id="{E013AA7C-0DDD-2AAB-E20A-68A262305189}"/>
               </a:ext>
             </a:extLst>
           </p:cNvPr>
@@ -6728,8 +6733,8 @@
         </p:blipFill>
         <p:spPr>
           <a:xfrm>
-            <a:off x="3179421" y="1544118"/>
-            <a:ext cx="5833158" cy="5051395"/>
+            <a:off x="1043569" y="1513358"/>
+            <a:ext cx="10484133" cy="4840790"/>
           </a:xfrm>
           <a:prstGeom prst="rect">
             <a:avLst/>
@@ -6739,7 +6744,7 @@
     </p:spTree>
     <p:extLst>
       <p:ext uri="{BB962C8B-B14F-4D97-AF65-F5344CB8AC3E}">
-        <p14:creationId xmlns:p14="http://schemas.microsoft.com/office/powerpoint/2010/main" val="3216433714"/>
+        <p14:creationId xmlns:p14="http://schemas.microsoft.com/office/powerpoint/2010/main" val="3327239054"/>
       </p:ext>
     </p:extLst>
   </p:cSld>
@@ -6768,10 +6773,10 @@
       </p:grpSpPr>
       <p:sp>
         <p:nvSpPr>
-          <p:cNvPr id="3" name="Title 2">
-            <a:extLst>
-              <a:ext uri="{FF2B5EF4-FFF2-40B4-BE49-F238E27FC236}">
-                <a16:creationId xmlns:a16="http://schemas.microsoft.com/office/drawing/2014/main" id="{F101732C-7338-DBA0-BD19-1FA88304749F}"/>
+          <p:cNvPr id="2" name="Title 1">
+            <a:extLst>
+              <a:ext uri="{FF2B5EF4-FFF2-40B4-BE49-F238E27FC236}">
+                <a16:creationId xmlns:a16="http://schemas.microsoft.com/office/drawing/2014/main" id="{CFDEBC60-AA38-5DEF-3160-0CAA68F3D28C}"/>
               </a:ext>
             </a:extLst>
           </p:cNvPr>
@@ -6784,64 +6789,85 @@
         </p:nvSpPr>
         <p:spPr>
           <a:xfrm>
-            <a:off x="1317614" y="690511"/>
-            <a:ext cx="8709255" cy="5253089"/>
+            <a:off x="1468815" y="503852"/>
+            <a:ext cx="9150675" cy="1427585"/>
           </a:xfrm>
         </p:spPr>
         <p:txBody>
-          <a:bodyPr anchor="t"/>
+          <a:bodyPr/>
           <a:lstStyle/>
           <a:p>
             <a:r>
-              <a:rPr lang="en-US" dirty="0"/>
-              <a:t>Thank you!</a:t>
+              <a:rPr lang="en-ZA" dirty="0"/>
+              <a:t>Appendices:</a:t>
             </a:r>
           </a:p>
         </p:txBody>
       </p:sp>
       <p:sp>
         <p:nvSpPr>
-          <p:cNvPr id="6" name="TextBox 5">
-            <a:extLst>
-              <a:ext uri="{FF2B5EF4-FFF2-40B4-BE49-F238E27FC236}">
-                <a16:creationId xmlns:a16="http://schemas.microsoft.com/office/drawing/2014/main" id="{B882ECDE-9185-5821-9D2E-B4B06D98D983}"/>
-              </a:ext>
-            </a:extLst>
-          </p:cNvPr>
-          <p:cNvSpPr txBox="1"/>
+          <p:cNvPr id="4" name="Slide Number Placeholder 3">
+            <a:extLst>
+              <a:ext uri="{FF2B5EF4-FFF2-40B4-BE49-F238E27FC236}">
+                <a16:creationId xmlns:a16="http://schemas.microsoft.com/office/drawing/2014/main" id="{527C964F-E2D5-D8E7-C513-C47A7E409DF3}"/>
+              </a:ext>
+            </a:extLst>
+          </p:cNvPr>
+          <p:cNvSpPr>
+            <a:spLocks noGrp="1"/>
+          </p:cNvSpPr>
+          <p:nvPr>
+            <p:ph type="sldNum" sz="quarter" idx="15"/>
+          </p:nvPr>
+        </p:nvSpPr>
+        <p:spPr/>
+        <p:txBody>
+          <a:bodyPr/>
+          <a:lstStyle/>
+          <a:p>
+            <a:fld id="{18D65601-5AE2-46FC-B138-694DDD2B510D}" type="slidenum">
+              <a:rPr lang="en-US" smtClean="0"/>
+              <a:pPr/>
+              <a:t>14</a:t>
+            </a:fld>
+            <a:endParaRPr lang="en-US" dirty="0"/>
+          </a:p>
+        </p:txBody>
+      </p:sp>
+      <p:pic>
+        <p:nvPicPr>
+          <p:cNvPr id="6" name="Picture 5" descr="A colorful squares with different colored numbers&#10;&#10;Description automatically generated with medium confidence">
+            <a:extLst>
+              <a:ext uri="{FF2B5EF4-FFF2-40B4-BE49-F238E27FC236}">
+                <a16:creationId xmlns:a16="http://schemas.microsoft.com/office/drawing/2014/main" id="{7C14183A-DEB2-64DA-1EA9-223477975388}"/>
+              </a:ext>
+            </a:extLst>
+          </p:cNvPr>
+          <p:cNvPicPr>
+            <a:picLocks noChangeAspect="1"/>
+          </p:cNvPicPr>
           <p:nvPr/>
-        </p:nvSpPr>
-        <p:spPr>
-          <a:xfrm>
-            <a:off x="4731565" y="2921168"/>
-            <a:ext cx="1881351" cy="1015663"/>
+        </p:nvPicPr>
+        <p:blipFill>
+          <a:blip r:embed="rId2"/>
+          <a:stretch>
+            <a:fillRect/>
+          </a:stretch>
+        </p:blipFill>
+        <p:spPr>
+          <a:xfrm>
+            <a:off x="3179421" y="1544118"/>
+            <a:ext cx="5833158" cy="5051395"/>
           </a:xfrm>
           <a:prstGeom prst="rect">
             <a:avLst/>
           </a:prstGeom>
-          <a:noFill/>
-        </p:spPr>
-        <p:txBody>
-          <a:bodyPr wrap="square" rtlCol="0">
-            <a:spAutoFit/>
-          </a:bodyPr>
-          <a:lstStyle/>
-          <a:p>
-            <a:r>
-              <a:rPr lang="en-FR" sz="6000" b="1" dirty="0">
-                <a:solidFill>
-                  <a:schemeClr val="bg1"/>
-                </a:solidFill>
-              </a:rPr>
-              <a:t>Q&amp;A</a:t>
-            </a:r>
-          </a:p>
-        </p:txBody>
-      </p:sp>
+        </p:spPr>
+      </p:pic>
     </p:spTree>
     <p:extLst>
       <p:ext uri="{BB962C8B-B14F-4D97-AF65-F5344CB8AC3E}">
-        <p14:creationId xmlns:p14="http://schemas.microsoft.com/office/powerpoint/2010/main" val="704370842"/>
+        <p14:creationId xmlns:p14="http://schemas.microsoft.com/office/powerpoint/2010/main" val="3216433714"/>
       </p:ext>
     </p:extLst>
   </p:cSld>
@@ -6959,7 +6985,7 @@
             </a:r>
             <a:r>
               <a:rPr lang="en-GB" sz="1800" b="1" dirty="0"/>
-              <a:t>1.2k</a:t>
+              <a:t>1.3k</a:t>
             </a:r>
             <a:r>
               <a:rPr lang="en-GB" sz="1800" dirty="0"/>
@@ -7041,6 +7067,36 @@
           </a:p>
         </p:txBody>
       </p:sp>
+      <p:pic>
+        <p:nvPicPr>
+          <p:cNvPr id="5" name="Picture 4" descr="A logo with blue text&#10;&#10;Description automatically generated">
+            <a:extLst>
+              <a:ext uri="{FF2B5EF4-FFF2-40B4-BE49-F238E27FC236}">
+                <a16:creationId xmlns:a16="http://schemas.microsoft.com/office/drawing/2014/main" id="{BAFC4C39-AF6A-7339-B820-1E4F50E255A9}"/>
+              </a:ext>
+            </a:extLst>
+          </p:cNvPr>
+          <p:cNvPicPr>
+            <a:picLocks noChangeAspect="1"/>
+          </p:cNvPicPr>
+          <p:nvPr/>
+        </p:nvPicPr>
+        <p:blipFill>
+          <a:blip r:embed="rId3"/>
+          <a:stretch>
+            <a:fillRect/>
+          </a:stretch>
+        </p:blipFill>
+        <p:spPr>
+          <a:xfrm>
+            <a:off x="9695155" y="0"/>
+            <a:ext cx="1598951" cy="914400"/>
+          </a:xfrm>
+          <a:prstGeom prst="rect">
+            <a:avLst/>
+          </a:prstGeom>
+        </p:spPr>
+      </p:pic>
     </p:spTree>
     <p:extLst>
       <p:ext uri="{BB962C8B-B14F-4D97-AF65-F5344CB8AC3E}">
@@ -7942,7 +7998,7 @@
         <p:spPr>
           <a:xfrm>
             <a:off x="1450153" y="2108722"/>
-            <a:ext cx="4146488" cy="4119463"/>
+            <a:ext cx="4146488" cy="4636462"/>
           </a:xfrm>
         </p:spPr>
         <p:txBody>
@@ -7953,7 +8009,15 @@
           <a:p>
             <a:r>
               <a:rPr lang="en-GB" sz="1800" b="1" u="sng" dirty="0"/>
-              <a:t>Train/Test Split &amp; Cross validation:</a:t>
+              <a:t>Train/Test </a:t>
+            </a:r>
+            <a:r>
+              <a:rPr lang="en-GB" sz="1800" b="1" u="sng" dirty="0" err="1"/>
+              <a:t>ShuffleSplit</a:t>
+            </a:r>
+            <a:r>
+              <a:rPr lang="en-GB" sz="1800" b="1" u="sng" dirty="0"/>
+              <a:t>:</a:t>
             </a:r>
           </a:p>
           <a:p>
@@ -7965,16 +8029,27 @@
           </a:p>
           <a:p>
             <a:pPr lvl="1"/>
+            <a:endParaRPr lang="en-GB" sz="1800" dirty="0"/>
+          </a:p>
+          <a:p>
+            <a:r>
+              <a:rPr lang="en-GB" sz="1800" b="1" u="sng" dirty="0"/>
+              <a:t>Cross validation:</a:t>
+            </a:r>
+            <a:endParaRPr lang="en-GB" sz="1800" dirty="0"/>
+          </a:p>
+          <a:p>
+            <a:pPr lvl="1"/>
+            <a:r>
+              <a:rPr lang="en-GB" sz="1800" dirty="0"/>
+              <a:t>5 folds</a:t>
+            </a:r>
+          </a:p>
+          <a:p>
+            <a:pPr lvl="1"/>
             <a:r>
               <a:rPr lang="en-GB" sz="1800" dirty="0"/>
               <a:t>Stratification &amp; Shuffling</a:t>
-            </a:r>
-          </a:p>
-          <a:p>
-            <a:pPr lvl="1"/>
-            <a:r>
-              <a:rPr lang="en-GB" sz="1800" dirty="0"/>
-              <a:t>5 folds</a:t>
             </a:r>
           </a:p>
           <a:p>
@@ -9763,8 +9838,13 @@
           <a:p>
             <a:r>
               <a:rPr lang="en-ZA" dirty="0"/>
-              <a:t>Results</a:t>
-            </a:r>
+              <a:t>Results on </a:t>
+            </a:r>
+            <a:r>
+              <a:rPr lang="en-ZA" dirty="0" err="1"/>
+              <a:t>Testset</a:t>
+            </a:r>
+            <a:endParaRPr lang="en-ZA" dirty="0"/>
           </a:p>
         </p:txBody>
       </p:sp>
@@ -9990,7 +10070,7 @@
           <a:p>
             <a:r>
               <a:rPr lang="en-ZA" dirty="0"/>
-              <a:t>Results</a:t>
+              <a:t>Results on Kaggle</a:t>
             </a:r>
           </a:p>
         </p:txBody>
@@ -10032,7 +10112,15 @@
             <a:pPr lvl="1"/>
             <a:r>
               <a:rPr lang="en-GB" sz="1800" dirty="0"/>
-              <a:t>Score of </a:t>
+              <a:t>Mean </a:t>
+            </a:r>
+            <a:r>
+              <a:rPr lang="en-GB" sz="1800" dirty="0" err="1"/>
+              <a:t>auc</a:t>
+            </a:r>
+            <a:r>
+              <a:rPr lang="en-GB" sz="1800" dirty="0"/>
+              <a:t> score of </a:t>
             </a:r>
             <a:r>
               <a:rPr lang="en-GB" sz="1800" b="1" dirty="0"/>
@@ -10051,7 +10139,7 @@
             </a:r>
             <a:r>
               <a:rPr lang="en-GB" sz="1800" b="1" dirty="0"/>
-              <a:t> 211</a:t>
+              <a:t> 220</a:t>
             </a:r>
             <a:r>
               <a:rPr lang="en-GB" sz="1800" dirty="0"/>
@@ -10059,7 +10147,7 @@
             </a:r>
             <a:r>
               <a:rPr lang="en-GB" sz="1800" b="1" dirty="0"/>
-              <a:t>1230 teams</a:t>
+              <a:t>1300 teams</a:t>
             </a:r>
             <a:r>
               <a:rPr lang="en-GB" sz="1800" dirty="0"/>
@@ -10111,7 +10199,15 @@
             <a:pPr lvl="1"/>
             <a:r>
               <a:rPr lang="en-GB" sz="1800" dirty="0"/>
-              <a:t>Feature Engineering:</a:t>
+              <a:t>Invest much more time on feature engineering &amp; </a:t>
+            </a:r>
+            <a:r>
+              <a:rPr lang="en-GB" sz="1800" dirty="0" err="1"/>
+              <a:t>modeling</a:t>
+            </a:r>
+            <a:r>
+              <a:rPr lang="en-GB" sz="1800" dirty="0"/>
+              <a:t>:</a:t>
             </a:r>
           </a:p>
           <a:p>
@@ -10191,6 +10287,36 @@
           <a:xfrm>
             <a:off x="2157952" y="3429000"/>
             <a:ext cx="7772400" cy="1022867"/>
+          </a:xfrm>
+          <a:prstGeom prst="rect">
+            <a:avLst/>
+          </a:prstGeom>
+        </p:spPr>
+      </p:pic>
+      <p:pic>
+        <p:nvPicPr>
+          <p:cNvPr id="7" name="Picture 6" descr="A logo with blue text&#10;&#10;Description automatically generated">
+            <a:extLst>
+              <a:ext uri="{FF2B5EF4-FFF2-40B4-BE49-F238E27FC236}">
+                <a16:creationId xmlns:a16="http://schemas.microsoft.com/office/drawing/2014/main" id="{52383B1D-D90F-35F4-9B59-BB0722FE4459}"/>
+              </a:ext>
+            </a:extLst>
+          </p:cNvPr>
+          <p:cNvPicPr>
+            <a:picLocks noChangeAspect="1"/>
+          </p:cNvPicPr>
+          <p:nvPr/>
+        </p:nvPicPr>
+        <p:blipFill>
+          <a:blip r:embed="rId4"/>
+          <a:stretch>
+            <a:fillRect/>
+          </a:stretch>
+        </p:blipFill>
+        <p:spPr>
+          <a:xfrm>
+            <a:off x="9695155" y="0"/>
+            <a:ext cx="1598951" cy="914400"/>
           </a:xfrm>
           <a:prstGeom prst="rect">
             <a:avLst/>
@@ -11031,12 +11157,23 @@
 </file>
 
 <file path=customXml/item1.xml><?xml version="1.0" encoding="utf-8"?>
-<?mso-contentType ?>
-<FormTemplates xmlns="http://schemas.microsoft.com/sharepoint/v3/contenttype/forms">
-  <Display>DocumentLibraryForm</Display>
-  <Edit>DocumentLibraryForm</Edit>
-  <New>DocumentLibraryForm</New>
-</FormTemplates>
+<p:properties xmlns:p="http://schemas.microsoft.com/office/2006/metadata/properties" xmlns:xsi="http://www.w3.org/2001/XMLSchema-instance" xmlns:pc="http://schemas.microsoft.com/office/infopath/2007/PartnerControls">
+  <documentManagement>
+    <_ip_UnifiedCompliancePolicyUIAction xmlns="http://schemas.microsoft.com/sharepoint/v3" xsi:nil="true"/>
+    <Image xmlns="71af3243-3dd4-4a8d-8c0d-dd76da1f02a5">
+      <Url xsi:nil="true"/>
+      <Description xsi:nil="true"/>
+    </Image>
+    <Status xmlns="71af3243-3dd4-4a8d-8c0d-dd76da1f02a5">Not started</Status>
+    <Background xmlns="71af3243-3dd4-4a8d-8c0d-dd76da1f02a5">false</Background>
+    <_ip_UnifiedCompliancePolicyProperties xmlns="http://schemas.microsoft.com/sharepoint/v3" xsi:nil="true"/>
+    <ImageTagsTaxHTField xmlns="71af3243-3dd4-4a8d-8c0d-dd76da1f02a5">
+      <Terms xmlns="http://schemas.microsoft.com/office/infopath/2007/PartnerControls"/>
+    </ImageTagsTaxHTField>
+    <TaxCatchAll xmlns="230e9df3-be65-4c73-a93b-d1236ebd677e" xsi:nil="true"/>
+    <MediaServiceKeyPoints xmlns="71af3243-3dd4-4a8d-8c0d-dd76da1f02a5" xsi:nil="true"/>
+  </documentManagement>
+</p:properties>
 </file>
 
 <file path=customXml/item2.xml><?xml version="1.0" encoding="utf-8"?>
@@ -11352,29 +11489,22 @@
 </file>
 
 <file path=customXml/item3.xml><?xml version="1.0" encoding="utf-8"?>
-<p:properties xmlns:p="http://schemas.microsoft.com/office/2006/metadata/properties" xmlns:xsi="http://www.w3.org/2001/XMLSchema-instance" xmlns:pc="http://schemas.microsoft.com/office/infopath/2007/PartnerControls">
-  <documentManagement>
-    <_ip_UnifiedCompliancePolicyUIAction xmlns="http://schemas.microsoft.com/sharepoint/v3" xsi:nil="true"/>
-    <Image xmlns="71af3243-3dd4-4a8d-8c0d-dd76da1f02a5">
-      <Url xsi:nil="true"/>
-      <Description xsi:nil="true"/>
-    </Image>
-    <Status xmlns="71af3243-3dd4-4a8d-8c0d-dd76da1f02a5">Not started</Status>
-    <Background xmlns="71af3243-3dd4-4a8d-8c0d-dd76da1f02a5">false</Background>
-    <_ip_UnifiedCompliancePolicyProperties xmlns="http://schemas.microsoft.com/sharepoint/v3" xsi:nil="true"/>
-    <ImageTagsTaxHTField xmlns="71af3243-3dd4-4a8d-8c0d-dd76da1f02a5">
-      <Terms xmlns="http://schemas.microsoft.com/office/infopath/2007/PartnerControls"/>
-    </ImageTagsTaxHTField>
-    <TaxCatchAll xmlns="230e9df3-be65-4c73-a93b-d1236ebd677e" xsi:nil="true"/>
-    <MediaServiceKeyPoints xmlns="71af3243-3dd4-4a8d-8c0d-dd76da1f02a5" xsi:nil="true"/>
-  </documentManagement>
-</p:properties>
+<?mso-contentType ?>
+<FormTemplates xmlns="http://schemas.microsoft.com/sharepoint/v3/contenttype/forms">
+  <Display>DocumentLibraryForm</Display>
+  <Edit>DocumentLibraryForm</Edit>
+  <New>DocumentLibraryForm</New>
+</FormTemplates>
 </file>
 
 <file path=customXml/itemProps1.xml><?xml version="1.0" encoding="utf-8"?>
-<ds:datastoreItem xmlns:ds="http://schemas.openxmlformats.org/officeDocument/2006/customXml" ds:itemID="{A98CD342-50C4-441F-B4A3-7D5ADB057132}">
+<ds:datastoreItem xmlns:ds="http://schemas.openxmlformats.org/officeDocument/2006/customXml" ds:itemID="{CBDD27D0-5B6E-4A0E-95B2-BB37F9D88615}">
   <ds:schemaRefs>
-    <ds:schemaRef ds:uri="http://schemas.microsoft.com/sharepoint/v3/contenttype/forms"/>
+    <ds:schemaRef ds:uri="http://schemas.microsoft.com/office/2006/metadata/properties"/>
+    <ds:schemaRef ds:uri="http://schemas.microsoft.com/office/infopath/2007/PartnerControls"/>
+    <ds:schemaRef ds:uri="http://schemas.microsoft.com/sharepoint/v3"/>
+    <ds:schemaRef ds:uri="71af3243-3dd4-4a8d-8c0d-dd76da1f02a5"/>
+    <ds:schemaRef ds:uri="230e9df3-be65-4c73-a93b-d1236ebd677e"/>
   </ds:schemaRefs>
 </ds:datastoreItem>
 </file>
@@ -11401,13 +11531,9 @@
 </file>
 
 <file path=customXml/itemProps3.xml><?xml version="1.0" encoding="utf-8"?>
-<ds:datastoreItem xmlns:ds="http://schemas.openxmlformats.org/officeDocument/2006/customXml" ds:itemID="{CBDD27D0-5B6E-4A0E-95B2-BB37F9D88615}">
+<ds:datastoreItem xmlns:ds="http://schemas.openxmlformats.org/officeDocument/2006/customXml" ds:itemID="{A98CD342-50C4-441F-B4A3-7D5ADB057132}">
   <ds:schemaRefs>
-    <ds:schemaRef ds:uri="http://schemas.microsoft.com/office/2006/metadata/properties"/>
-    <ds:schemaRef ds:uri="http://schemas.microsoft.com/office/infopath/2007/PartnerControls"/>
-    <ds:schemaRef ds:uri="http://schemas.microsoft.com/sharepoint/v3"/>
-    <ds:schemaRef ds:uri="71af3243-3dd4-4a8d-8c0d-dd76da1f02a5"/>
-    <ds:schemaRef ds:uri="230e9df3-be65-4c73-a93b-d1236ebd677e"/>
+    <ds:schemaRef ds:uri="http://schemas.microsoft.com/sharepoint/v3/contenttype/forms"/>
   </ds:schemaRefs>
 </ds:datastoreItem>
 </file>

</xml_diff>